<commit_message>
Update control light skill
</commit_message>
<xml_diff>
--- a/14-15. Đèn thông minh/Đèn thông minh Xây dựng thiết bị trên AWS IoT.pptx
+++ b/14-15. Đèn thông minh/Đèn thông minh Xây dựng thiết bị trên AWS IoT.pptx
@@ -111,6 +111,11 @@
       </a:defRPr>
     </a:lvl9pPr>
   </p:defaultTextStyle>
+  <p:extLst>
+    <p:ext uri="{EFAFB233-063F-42B5-8137-9DF3F51BA10A}">
+      <p15:sldGuideLst xmlns:p15="http://schemas.microsoft.com/office/powerpoint/2012/main"/>
+    </p:ext>
+  </p:extLst>
 </p:presentation>
 </file>
 
@@ -340,7 +345,7 @@
           </ac:spMkLst>
         </pc:spChg>
         <pc:picChg chg="add del mod">
-          <ac:chgData name="Huong Nguyen" userId="a3438fb82b5343a2" providerId="LiveId" clId="{9766D993-ED34-4260-AEFD-5FB202A119D5}" dt="2018-04-22T08:30:24.939" v="394"/>
+          <ac:chgData name="Huong Nguyen" userId="a3438fb82b5343a2" providerId="LiveId" clId="{9766D993-ED34-4260-AEFD-5FB202A119D5}" dt="2018-04-22T08:30:24.939" v="394" actId="1076"/>
           <ac:picMkLst>
             <pc:docMk/>
             <pc:sldMk cId="3864306079" sldId="307"/>
@@ -356,7 +361,7 @@
           </ac:picMkLst>
         </pc:picChg>
         <pc:picChg chg="add del mod">
-          <ac:chgData name="Huong Nguyen" userId="a3438fb82b5343a2" providerId="LiveId" clId="{9766D993-ED34-4260-AEFD-5FB202A119D5}" dt="2018-04-22T08:31:12.147" v="404"/>
+          <ac:chgData name="Huong Nguyen" userId="a3438fb82b5343a2" providerId="LiveId" clId="{9766D993-ED34-4260-AEFD-5FB202A119D5}" dt="2018-04-22T08:31:12.147" v="404" actId="1076"/>
           <ac:picMkLst>
             <pc:docMk/>
             <pc:sldMk cId="3864306079" sldId="307"/>
@@ -380,7 +385,7 @@
           </ac:picMkLst>
         </pc:picChg>
         <pc:picChg chg="add del mod">
-          <ac:chgData name="Huong Nguyen" userId="a3438fb82b5343a2" providerId="LiveId" clId="{9766D993-ED34-4260-AEFD-5FB202A119D5}" dt="2018-04-22T08:34:30.538" v="421"/>
+          <ac:chgData name="Huong Nguyen" userId="a3438fb82b5343a2" providerId="LiveId" clId="{9766D993-ED34-4260-AEFD-5FB202A119D5}" dt="2018-04-22T08:34:30.538" v="421" actId="1076"/>
           <ac:picMkLst>
             <pc:docMk/>
             <pc:sldMk cId="3864306079" sldId="307"/>
@@ -397,7 +402,7 @@
         </pc:picChg>
       </pc:sldChg>
       <pc:sldChg chg="add">
-        <pc:chgData name="Huong Nguyen" userId="a3438fb82b5343a2" providerId="LiveId" clId="{9766D993-ED34-4260-AEFD-5FB202A119D5}" dt="2018-04-22T08:24:18.708" v="104"/>
+        <pc:chgData name="Huong Nguyen" userId="a3438fb82b5343a2" providerId="LiveId" clId="{9766D993-ED34-4260-AEFD-5FB202A119D5}" dt="2018-04-22T08:24:18.708" v="104" actId="20577"/>
         <pc:sldMkLst>
           <pc:docMk/>
           <pc:sldMk cId="116559371" sldId="308"/>
@@ -747,6 +752,149 @@
         </pc:cxnChg>
         <pc:cxnChg chg="add mod">
           <ac:chgData name="Huong Nguyen" userId="a3438fb82b5343a2" providerId="LiveId" clId="{9766D993-ED34-4260-AEFD-5FB202A119D5}" dt="2018-04-22T08:55:59.324" v="1146" actId="1038"/>
+          <ac:cxnSpMkLst>
+            <pc:docMk/>
+            <pc:sldMk cId="583298047" sldId="309"/>
+            <ac:cxnSpMk id="53" creationId="{642BE71E-6636-4719-85B1-EEADE168DEBE}"/>
+          </ac:cxnSpMkLst>
+        </pc:cxnChg>
+      </pc:sldChg>
+    </pc:docChg>
+  </pc:docChgLst>
+  <pc:docChgLst>
+    <pc:chgData name="Huong Nguyen" userId="a3438fb82b5343a2" providerId="LiveId" clId="{B490EEB7-6B1F-4504-BBEF-A30D088E9731}"/>
+    <pc:docChg chg="custSel modSld">
+      <pc:chgData name="Huong Nguyen" userId="a3438fb82b5343a2" providerId="LiveId" clId="{B490EEB7-6B1F-4504-BBEF-A30D088E9731}" dt="2018-04-22T10:54:48.018" v="216" actId="20577"/>
+      <pc:docMkLst>
+        <pc:docMk/>
+      </pc:docMkLst>
+      <pc:sldChg chg="modSp">
+        <pc:chgData name="Huong Nguyen" userId="a3438fb82b5343a2" providerId="LiveId" clId="{B490EEB7-6B1F-4504-BBEF-A30D088E9731}" dt="2018-04-22T10:54:48.018" v="216" actId="20577"/>
+        <pc:sldMkLst>
+          <pc:docMk/>
+          <pc:sldMk cId="116559371" sldId="308"/>
+        </pc:sldMkLst>
+        <pc:spChg chg="mod">
+          <ac:chgData name="Huong Nguyen" userId="a3438fb82b5343a2" providerId="LiveId" clId="{B490EEB7-6B1F-4504-BBEF-A30D088E9731}" dt="2018-04-22T10:54:48.018" v="216" actId="20577"/>
+          <ac:spMkLst>
+            <pc:docMk/>
+            <pc:sldMk cId="116559371" sldId="308"/>
+            <ac:spMk id="2" creationId="{395C4E5F-9B88-4AE8-AFB1-7FC0372546C2}"/>
+          </ac:spMkLst>
+        </pc:spChg>
+      </pc:sldChg>
+      <pc:sldChg chg="addSp modSp">
+        <pc:chgData name="Huong Nguyen" userId="a3438fb82b5343a2" providerId="LiveId" clId="{B490EEB7-6B1F-4504-BBEF-A30D088E9731}" dt="2018-04-22T10:54:34.363" v="181" actId="1036"/>
+        <pc:sldMkLst>
+          <pc:docMk/>
+          <pc:sldMk cId="583298047" sldId="309"/>
+        </pc:sldMkLst>
+        <pc:spChg chg="mod">
+          <ac:chgData name="Huong Nguyen" userId="a3438fb82b5343a2" providerId="LiveId" clId="{B490EEB7-6B1F-4504-BBEF-A30D088E9731}" dt="2018-04-22T10:54:24.077" v="165" actId="1035"/>
+          <ac:spMkLst>
+            <pc:docMk/>
+            <pc:sldMk cId="583298047" sldId="309"/>
+            <ac:spMk id="5" creationId="{9A605909-A7D6-4CFC-906C-A6AEC1BE0584}"/>
+          </ac:spMkLst>
+        </pc:spChg>
+        <pc:spChg chg="mod">
+          <ac:chgData name="Huong Nguyen" userId="a3438fb82b5343a2" providerId="LiveId" clId="{B490EEB7-6B1F-4504-BBEF-A30D088E9731}" dt="2018-04-22T10:54:24.077" v="165" actId="1035"/>
+          <ac:spMkLst>
+            <pc:docMk/>
+            <pc:sldMk cId="583298047" sldId="309"/>
+            <ac:spMk id="7" creationId="{8E011337-9199-44E3-8D44-53B35FC062AF}"/>
+          </ac:spMkLst>
+        </pc:spChg>
+        <pc:spChg chg="mod">
+          <ac:chgData name="Huong Nguyen" userId="a3438fb82b5343a2" providerId="LiveId" clId="{B490EEB7-6B1F-4504-BBEF-A30D088E9731}" dt="2018-04-22T10:54:24.077" v="165" actId="1035"/>
+          <ac:spMkLst>
+            <pc:docMk/>
+            <pc:sldMk cId="583298047" sldId="309"/>
+            <ac:spMk id="16" creationId="{CFCEAC52-E5C0-4B12-B892-A9F3A340A218}"/>
+          </ac:spMkLst>
+        </pc:spChg>
+        <pc:spChg chg="add mod">
+          <ac:chgData name="Huong Nguyen" userId="a3438fb82b5343a2" providerId="LiveId" clId="{B490EEB7-6B1F-4504-BBEF-A30D088E9731}" dt="2018-04-22T10:54:27.683" v="166" actId="1076"/>
+          <ac:spMkLst>
+            <pc:docMk/>
+            <pc:sldMk cId="583298047" sldId="309"/>
+            <ac:spMk id="17" creationId="{471A9195-384A-498F-BE53-BE4CF7BD9E00}"/>
+          </ac:spMkLst>
+        </pc:spChg>
+        <pc:spChg chg="mod">
+          <ac:chgData name="Huong Nguyen" userId="a3438fb82b5343a2" providerId="LiveId" clId="{B490EEB7-6B1F-4504-BBEF-A30D088E9731}" dt="2018-04-22T10:54:24.077" v="165" actId="1035"/>
+          <ac:spMkLst>
+            <pc:docMk/>
+            <pc:sldMk cId="583298047" sldId="309"/>
+            <ac:spMk id="41" creationId="{B7D0A7C4-80C6-423B-AAEC-0D2E6708F1D1}"/>
+          </ac:spMkLst>
+        </pc:spChg>
+        <pc:spChg chg="mod">
+          <ac:chgData name="Huong Nguyen" userId="a3438fb82b5343a2" providerId="LiveId" clId="{B490EEB7-6B1F-4504-BBEF-A30D088E9731}" dt="2018-04-22T10:54:24.077" v="165" actId="1035"/>
+          <ac:spMkLst>
+            <pc:docMk/>
+            <pc:sldMk cId="583298047" sldId="309"/>
+            <ac:spMk id="52" creationId="{B7D9F3BB-73DA-4713-90DC-E81E03CE22DF}"/>
+          </ac:spMkLst>
+        </pc:spChg>
+        <pc:spChg chg="mod">
+          <ac:chgData name="Huong Nguyen" userId="a3438fb82b5343a2" providerId="LiveId" clId="{B490EEB7-6B1F-4504-BBEF-A30D088E9731}" dt="2018-04-22T10:54:24.077" v="165" actId="1035"/>
+          <ac:spMkLst>
+            <pc:docMk/>
+            <pc:sldMk cId="583298047" sldId="309"/>
+            <ac:spMk id="59" creationId="{DF70D952-FB5C-4A8F-AC2D-F606051B812B}"/>
+          </ac:spMkLst>
+        </pc:spChg>
+        <pc:picChg chg="mod">
+          <ac:chgData name="Huong Nguyen" userId="a3438fb82b5343a2" providerId="LiveId" clId="{B490EEB7-6B1F-4504-BBEF-A30D088E9731}" dt="2018-04-22T10:54:24.077" v="165" actId="1035"/>
+          <ac:picMkLst>
+            <pc:docMk/>
+            <pc:sldMk cId="583298047" sldId="309"/>
+            <ac:picMk id="24" creationId="{33D5C890-BEFF-48B9-811D-ECBE2C6ED92B}"/>
+          </ac:picMkLst>
+        </pc:picChg>
+        <pc:picChg chg="mod">
+          <ac:chgData name="Huong Nguyen" userId="a3438fb82b5343a2" providerId="LiveId" clId="{B490EEB7-6B1F-4504-BBEF-A30D088E9731}" dt="2018-04-22T10:54:24.077" v="165" actId="1035"/>
+          <ac:picMkLst>
+            <pc:docMk/>
+            <pc:sldMk cId="583298047" sldId="309"/>
+            <ac:picMk id="25" creationId="{A90A99AC-BCFA-4EC4-BF43-9E4037B6A241}"/>
+          </ac:picMkLst>
+        </pc:picChg>
+        <pc:picChg chg="mod">
+          <ac:chgData name="Huong Nguyen" userId="a3438fb82b5343a2" providerId="LiveId" clId="{B490EEB7-6B1F-4504-BBEF-A30D088E9731}" dt="2018-04-22T10:54:34.363" v="181" actId="1036"/>
+          <ac:picMkLst>
+            <pc:docMk/>
+            <pc:sldMk cId="583298047" sldId="309"/>
+            <ac:picMk id="63" creationId="{CBABAD72-379E-4CCD-A630-112A0FEA7A96}"/>
+          </ac:picMkLst>
+        </pc:picChg>
+        <pc:picChg chg="mod">
+          <ac:chgData name="Huong Nguyen" userId="a3438fb82b5343a2" providerId="LiveId" clId="{B490EEB7-6B1F-4504-BBEF-A30D088E9731}" dt="2018-04-22T10:54:24.077" v="165" actId="1035"/>
+          <ac:picMkLst>
+            <pc:docMk/>
+            <pc:sldMk cId="583298047" sldId="309"/>
+            <ac:picMk id="2050" creationId="{A7E1EDFC-7911-41F5-922A-6B441322B947}"/>
+          </ac:picMkLst>
+        </pc:picChg>
+        <pc:cxnChg chg="mod">
+          <ac:chgData name="Huong Nguyen" userId="a3438fb82b5343a2" providerId="LiveId" clId="{B490EEB7-6B1F-4504-BBEF-A30D088E9731}" dt="2018-04-22T10:54:24.077" v="165" actId="1035"/>
+          <ac:cxnSpMkLst>
+            <pc:docMk/>
+            <pc:sldMk cId="583298047" sldId="309"/>
+            <ac:cxnSpMk id="10" creationId="{9DA148CD-8C54-484F-9AA1-290D373D88C7}"/>
+          </ac:cxnSpMkLst>
+        </pc:cxnChg>
+        <pc:cxnChg chg="mod">
+          <ac:chgData name="Huong Nguyen" userId="a3438fb82b5343a2" providerId="LiveId" clId="{B490EEB7-6B1F-4504-BBEF-A30D088E9731}" dt="2018-04-22T10:54:24.077" v="165" actId="1035"/>
+          <ac:cxnSpMkLst>
+            <pc:docMk/>
+            <pc:sldMk cId="583298047" sldId="309"/>
+            <ac:cxnSpMk id="49" creationId="{1F85E5A2-03E3-483C-AFFE-674D06EDC954}"/>
+          </ac:cxnSpMkLst>
+        </pc:cxnChg>
+        <pc:cxnChg chg="mod">
+          <ac:chgData name="Huong Nguyen" userId="a3438fb82b5343a2" providerId="LiveId" clId="{B490EEB7-6B1F-4504-BBEF-A30D088E9731}" dt="2018-04-22T10:54:24.077" v="165" actId="1035"/>
           <ac:cxnSpMkLst>
             <pc:docMk/>
             <pc:sldMk cId="583298047" sldId="309"/>
@@ -6012,7 +6160,7 @@
         </p:nvSpPr>
         <p:spPr>
           <a:xfrm>
-            <a:off x="3991348" y="2899700"/>
+            <a:off x="3991348" y="2731535"/>
             <a:ext cx="1798434" cy="881103"/>
           </a:xfrm>
           <a:prstGeom prst="roundRect">
@@ -6154,7 +6302,7 @@
         </p:nvSpPr>
         <p:spPr>
           <a:xfrm>
-            <a:off x="9568356" y="2116786"/>
+            <a:off x="9568356" y="1948621"/>
             <a:ext cx="1606575" cy="827569"/>
           </a:xfrm>
           <a:prstGeom prst="roundRect">
@@ -6298,13 +6446,12 @@
           <p:cNvCxnSpPr>
             <a:cxnSpLocks/>
             <a:stCxn id="5" idx="1"/>
-            <a:endCxn id="12" idx="3"/>
           </p:cNvCxnSpPr>
           <p:nvPr/>
         </p:nvCxnSpPr>
         <p:spPr>
           <a:xfrm rot="10800000">
-            <a:off x="2734780" y="3340252"/>
+            <a:off x="2734780" y="3172087"/>
             <a:ext cx="1256568" cy="1"/>
           </a:xfrm>
           <a:prstGeom prst="curvedConnector3">
@@ -6505,7 +6652,7 @@
         </p:nvSpPr>
         <p:spPr>
           <a:xfrm>
-            <a:off x="7380365" y="3861300"/>
+            <a:off x="7380365" y="3693135"/>
             <a:ext cx="1870763" cy="727494"/>
           </a:xfrm>
           <a:prstGeom prst="roundRect">
@@ -6662,7 +6809,7 @@
         </p:blipFill>
         <p:spPr bwMode="auto">
           <a:xfrm>
-            <a:off x="7532651" y="3995394"/>
+            <a:off x="7532651" y="3827229"/>
             <a:ext cx="443996" cy="459306"/>
           </a:xfrm>
           <a:prstGeom prst="rect">
@@ -6709,7 +6856,7 @@
         </p:blipFill>
         <p:spPr bwMode="auto">
           <a:xfrm>
-            <a:off x="3856585" y="2769021"/>
+            <a:off x="3856585" y="2600856"/>
             <a:ext cx="1228903" cy="1228903"/>
           </a:xfrm>
           <a:prstGeom prst="rect">
@@ -6741,7 +6888,7 @@
         </p:nvSpPr>
         <p:spPr>
           <a:xfrm>
-            <a:off x="2722358" y="2743197"/>
+            <a:off x="2722358" y="2575032"/>
             <a:ext cx="1228903" cy="584775"/>
           </a:xfrm>
           <a:prstGeom prst="rect">
@@ -6914,7 +7061,7 @@
         </p:blipFill>
         <p:spPr bwMode="auto">
           <a:xfrm>
-            <a:off x="9568356" y="2054435"/>
+            <a:off x="9568356" y="1886270"/>
             <a:ext cx="1009414" cy="1009414"/>
           </a:xfrm>
           <a:prstGeom prst="rect">
@@ -6950,7 +7097,7 @@
         </p:nvCxnSpPr>
         <p:spPr>
           <a:xfrm rot="10800000" flipV="1">
-            <a:off x="8315748" y="2559142"/>
+            <a:off x="8315748" y="2390977"/>
             <a:ext cx="1252609" cy="1302158"/>
           </a:xfrm>
           <a:prstGeom prst="curvedConnector2">
@@ -6993,7 +7140,7 @@
         </p:nvSpPr>
         <p:spPr>
           <a:xfrm>
-            <a:off x="8497743" y="3158695"/>
+            <a:off x="8497743" y="2990530"/>
             <a:ext cx="1725152" cy="338554"/>
           </a:xfrm>
           <a:prstGeom prst="rect">
@@ -7150,7 +7297,7 @@
         </p:nvCxnSpPr>
         <p:spPr>
           <a:xfrm rot="10800000">
-            <a:off x="4890565" y="3780803"/>
+            <a:off x="4890565" y="3612638"/>
             <a:ext cx="2489800" cy="444244"/>
           </a:xfrm>
           <a:prstGeom prst="curvedConnector2">
@@ -7193,7 +7340,7 @@
         </p:nvSpPr>
         <p:spPr>
           <a:xfrm>
-            <a:off x="5452209" y="4215045"/>
+            <a:off x="5452209" y="4046880"/>
             <a:ext cx="1633262" cy="584775"/>
           </a:xfrm>
           <a:prstGeom prst="rect">
@@ -7362,7 +7509,7 @@
         </p:blipFill>
         <p:spPr bwMode="auto">
           <a:xfrm>
-            <a:off x="655200" y="2958201"/>
+            <a:off x="655200" y="2958197"/>
             <a:ext cx="736407" cy="764099"/>
           </a:xfrm>
           <a:prstGeom prst="rect">
@@ -7380,6 +7527,76 @@
           </a:extLst>
         </p:spPr>
       </p:pic>
+      <p:sp>
+        <p:nvSpPr>
+          <p:cNvPr id="17" name="Title 1">
+            <a:extLst>
+              <a:ext uri="{FF2B5EF4-FFF2-40B4-BE49-F238E27FC236}">
+                <a16:creationId xmlns:a16="http://schemas.microsoft.com/office/drawing/2014/main" id="{471A9195-384A-498F-BE53-BE4CF7BD9E00}"/>
+              </a:ext>
+            </a:extLst>
+          </p:cNvPr>
+          <p:cNvSpPr txBox="1">
+            <a:spLocks/>
+          </p:cNvSpPr>
+          <p:nvPr/>
+        </p:nvSpPr>
+        <p:spPr>
+          <a:xfrm>
+            <a:off x="615248" y="5179135"/>
+            <a:ext cx="8016766" cy="727494"/>
+          </a:xfrm>
+          <a:prstGeom prst="rect">
+            <a:avLst/>
+          </a:prstGeom>
+        </p:spPr>
+        <p:txBody>
+          <a:bodyPr vert="horz" lIns="91440" tIns="45720" rIns="91440" bIns="45720" rtlCol="0" anchor="ctr">
+            <a:normAutofit/>
+          </a:bodyPr>
+          <a:lstStyle>
+            <a:lvl1pPr algn="l" defTabSz="914400" rtl="0" eaLnBrk="1" latinLnBrk="0" hangingPunct="1">
+              <a:lnSpc>
+                <a:spcPct val="90000"/>
+              </a:lnSpc>
+              <a:spcBef>
+                <a:spcPct val="0"/>
+              </a:spcBef>
+              <a:buNone/>
+              <a:defRPr sz="4400" kern="1200">
+                <a:solidFill>
+                  <a:schemeClr val="tx1"/>
+                </a:solidFill>
+                <a:latin typeface="+mj-lt"/>
+                <a:ea typeface="+mj-ea"/>
+                <a:cs typeface="+mj-cs"/>
+              </a:defRPr>
+            </a:lvl1pPr>
+          </a:lstStyle>
+          <a:p>
+            <a:r>
+              <a:rPr lang="en-US" sz="2800" dirty="0"/>
+              <a:t>Qui </a:t>
+            </a:r>
+            <a:r>
+              <a:rPr lang="en-US" sz="2800" dirty="0" err="1"/>
+              <a:t>định</a:t>
+            </a:r>
+            <a:r>
+              <a:rPr lang="en-US" sz="2800" dirty="0"/>
+              <a:t> topic subscribe: “</a:t>
+            </a:r>
+            <a:r>
+              <a:rPr lang="en-US" sz="2800" dirty="0" err="1"/>
+              <a:t>aws</a:t>
+            </a:r>
+            <a:r>
+              <a:rPr lang="en-US" sz="2800" dirty="0"/>
+              <a:t>/light/control/”</a:t>
+            </a:r>
+          </a:p>
+        </p:txBody>
+      </p:sp>
     </p:spTree>
     <p:extLst>
       <p:ext uri="{BB962C8B-B14F-4D97-AF65-F5344CB8AC3E}">
@@ -7431,7 +7648,19 @@
           <a:bodyPr/>
           <a:lstStyle/>
           <a:p>
-            <a:endParaRPr lang="en-US"/>
+            <a:r>
+              <a:rPr lang="en-US" dirty="0" err="1"/>
+              <a:t>Thực</a:t>
+            </a:r>
+            <a:r>
+              <a:rPr lang="en-US" dirty="0"/>
+              <a:t> </a:t>
+            </a:r>
+            <a:r>
+              <a:rPr lang="en-US" dirty="0" err="1"/>
+              <a:t>hành</a:t>
+            </a:r>
+            <a:endParaRPr lang="en-US" dirty="0"/>
           </a:p>
         </p:txBody>
       </p:sp>

</xml_diff>